<commit_message>
moving html file to static and fixing presentation
</commit_message>
<xml_diff>
--- a/Presentation/Melb House Price Prediction with Machine Learning - Group 7.pptx
+++ b/Presentation/Melb House Price Prediction with Machine Learning - Group 7.pptx
@@ -215,7 +215,7 @@
           <a:p>
             <a:fld id="{FBAA9256-2230-4E9D-83AF-6C53407F50CC}" type="datetimeFigureOut">
               <a:rPr lang="en-AU" smtClean="0"/>
-              <a:t>5/11/2023</a:t>
+              <a:t>6/11/2023</a:t>
             </a:fld>
             <a:endParaRPr lang="en-AU"/>
           </a:p>
@@ -709,7 +709,7 @@
           <a:p>
             <a:fld id="{5BCAD085-E8A6-8845-BD4E-CB4CCA059FC4}" type="datetimeFigureOut">
               <a:rPr lang="en-US" smtClean="0"/>
-              <a:t>11/5/2023</a:t>
+              <a:t>11/6/2023</a:t>
             </a:fld>
             <a:endParaRPr lang="en-US"/>
           </a:p>
@@ -917,7 +917,7 @@
           <a:p>
             <a:fld id="{5BCAD085-E8A6-8845-BD4E-CB4CCA059FC4}" type="datetimeFigureOut">
               <a:rPr lang="en-US" smtClean="0"/>
-              <a:t>11/5/2023</a:t>
+              <a:t>11/6/2023</a:t>
             </a:fld>
             <a:endParaRPr lang="en-US"/>
           </a:p>
@@ -1173,7 +1173,7 @@
           <a:p>
             <a:fld id="{5BCAD085-E8A6-8845-BD4E-CB4CCA059FC4}" type="datetimeFigureOut">
               <a:rPr lang="en-US" smtClean="0"/>
-              <a:t>11/5/2023</a:t>
+              <a:t>11/6/2023</a:t>
             </a:fld>
             <a:endParaRPr lang="en-US"/>
           </a:p>
@@ -1343,7 +1343,7 @@
           <a:p>
             <a:fld id="{5BCAD085-E8A6-8845-BD4E-CB4CCA059FC4}" type="datetimeFigureOut">
               <a:rPr lang="en-US" smtClean="0"/>
-              <a:t>11/5/2023</a:t>
+              <a:t>11/6/2023</a:t>
             </a:fld>
             <a:endParaRPr lang="en-US"/>
           </a:p>
@@ -1686,7 +1686,7 @@
           <a:p>
             <a:fld id="{5BCAD085-E8A6-8845-BD4E-CB4CCA059FC4}" type="datetimeFigureOut">
               <a:rPr lang="en-US" smtClean="0"/>
-              <a:t>11/5/2023</a:t>
+              <a:t>11/6/2023</a:t>
             </a:fld>
             <a:endParaRPr lang="en-US"/>
           </a:p>
@@ -1961,7 +1961,7 @@
           <a:p>
             <a:fld id="{5BCAD085-E8A6-8845-BD4E-CB4CCA059FC4}" type="datetimeFigureOut">
               <a:rPr lang="en-US" smtClean="0"/>
-              <a:t>11/5/2023</a:t>
+              <a:t>11/6/2023</a:t>
             </a:fld>
             <a:endParaRPr lang="en-US"/>
           </a:p>
@@ -2340,7 +2340,7 @@
           <a:p>
             <a:fld id="{5BCAD085-E8A6-8845-BD4E-CB4CCA059FC4}" type="datetimeFigureOut">
               <a:rPr lang="en-US" smtClean="0"/>
-              <a:t>11/5/2023</a:t>
+              <a:t>11/6/2023</a:t>
             </a:fld>
             <a:endParaRPr lang="en-US"/>
           </a:p>
@@ -2458,7 +2458,7 @@
           <a:p>
             <a:fld id="{5BCAD085-E8A6-8845-BD4E-CB4CCA059FC4}" type="datetimeFigureOut">
               <a:rPr lang="en-US" smtClean="0"/>
-              <a:t>11/5/2023</a:t>
+              <a:t>11/6/2023</a:t>
             </a:fld>
             <a:endParaRPr lang="en-US"/>
           </a:p>
@@ -2629,7 +2629,7 @@
           <a:p>
             <a:fld id="{5BCAD085-E8A6-8845-BD4E-CB4CCA059FC4}" type="datetimeFigureOut">
               <a:rPr lang="en-US" smtClean="0"/>
-              <a:t>11/5/2023</a:t>
+              <a:t>11/6/2023</a:t>
             </a:fld>
             <a:endParaRPr lang="en-US"/>
           </a:p>
@@ -2983,7 +2983,7 @@
           <a:p>
             <a:fld id="{5BCAD085-E8A6-8845-BD4E-CB4CCA059FC4}" type="datetimeFigureOut">
               <a:rPr lang="en-US" smtClean="0"/>
-              <a:t>11/5/2023</a:t>
+              <a:t>11/6/2023</a:t>
             </a:fld>
             <a:endParaRPr lang="en-US"/>
           </a:p>
@@ -3365,7 +3365,7 @@
           <a:p>
             <a:fld id="{5BCAD085-E8A6-8845-BD4E-CB4CCA059FC4}" type="datetimeFigureOut">
               <a:rPr lang="en-US" smtClean="0"/>
-              <a:t>11/5/2023</a:t>
+              <a:t>11/6/2023</a:t>
             </a:fld>
             <a:endParaRPr lang="en-US"/>
           </a:p>
@@ -3652,7 +3652,7 @@
           <a:p>
             <a:fld id="{5BCAD085-E8A6-8845-BD4E-CB4CCA059FC4}" type="datetimeFigureOut">
               <a:rPr lang="en-US" smtClean="0"/>
-              <a:t>11/5/2023</a:t>
+              <a:t>11/6/2023</a:t>
             </a:fld>
             <a:endParaRPr lang="en-US"/>
           </a:p>
@@ -5590,7 +5590,7 @@
         </p:blipFill>
         <p:spPr>
           <a:xfrm>
-            <a:off x="2544531" y="3287284"/>
+            <a:off x="3394135" y="3319780"/>
             <a:ext cx="1684639" cy="1360162"/>
           </a:xfrm>
         </p:spPr>
@@ -5624,7 +5624,7 @@
         </p:blipFill>
         <p:spPr bwMode="auto">
           <a:xfrm>
-            <a:off x="2695085" y="1880093"/>
+            <a:off x="1144976" y="1963784"/>
             <a:ext cx="1358670" cy="1266098"/>
           </a:xfrm>
           <a:prstGeom prst="rect">
@@ -5671,7 +5671,7 @@
         </p:blipFill>
         <p:spPr bwMode="auto">
           <a:xfrm>
-            <a:off x="2692941" y="4841237"/>
+            <a:off x="1083253" y="4573567"/>
             <a:ext cx="1482115" cy="1212090"/>
           </a:xfrm>
           <a:prstGeom prst="rect">
@@ -5711,7 +5711,7 @@
         </p:blipFill>
         <p:spPr>
           <a:xfrm>
-            <a:off x="5960174" y="3146191"/>
+            <a:off x="6186909" y="3229882"/>
             <a:ext cx="1593057" cy="1435608"/>
           </a:xfrm>
           <a:prstGeom prst="rect">
@@ -5757,36 +5757,6 @@
           </a:p>
         </p:txBody>
       </p:sp>
-      <p:pic>
-        <p:nvPicPr>
-          <p:cNvPr id="24" name="Picture 23">
-            <a:extLst>
-              <a:ext uri="{FF2B5EF4-FFF2-40B4-BE49-F238E27FC236}">
-                <a16:creationId xmlns:a16="http://schemas.microsoft.com/office/drawing/2014/main" id="{C7818946-1DC3-5EE3-6123-BB4768002D96}"/>
-              </a:ext>
-            </a:extLst>
-          </p:cNvPr>
-          <p:cNvPicPr>
-            <a:picLocks noChangeAspect="1"/>
-          </p:cNvPicPr>
-          <p:nvPr/>
-        </p:nvPicPr>
-        <p:blipFill>
-          <a:blip r:embed="rId6"/>
-          <a:stretch>
-            <a:fillRect/>
-          </a:stretch>
-        </p:blipFill>
-        <p:spPr>
-          <a:xfrm>
-            <a:off x="4210030" y="3244334"/>
-            <a:ext cx="1409603" cy="1435608"/>
-          </a:xfrm>
-          <a:prstGeom prst="rect">
-            <a:avLst/>
-          </a:prstGeom>
-        </p:spPr>
-      </p:pic>
       <p:pic>
         <p:nvPicPr>
           <p:cNvPr id="28" name="Picture 27">
@@ -5808,9 +5778,69 @@
           </a:stretch>
         </p:blipFill>
         <p:spPr>
-          <a:xfrm>
-            <a:off x="1005663" y="3211838"/>
-            <a:ext cx="1409603" cy="1435608"/>
+          <a:xfrm rot="2363766">
+            <a:off x="2586509" y="2309914"/>
+            <a:ext cx="984944" cy="1435608"/>
+          </a:xfrm>
+          <a:prstGeom prst="rect">
+            <a:avLst/>
+          </a:prstGeom>
+        </p:spPr>
+      </p:pic>
+      <p:pic>
+        <p:nvPicPr>
+          <p:cNvPr id="3" name="Picture 2">
+            <a:extLst>
+              <a:ext uri="{FF2B5EF4-FFF2-40B4-BE49-F238E27FC236}">
+                <a16:creationId xmlns:a16="http://schemas.microsoft.com/office/drawing/2014/main" id="{71541757-4319-0A4B-8864-3C37DA01788F}"/>
+              </a:ext>
+            </a:extLst>
+          </p:cNvPr>
+          <p:cNvPicPr>
+            <a:picLocks noChangeAspect="1"/>
+          </p:cNvPicPr>
+          <p:nvPr/>
+        </p:nvPicPr>
+        <p:blipFill>
+          <a:blip r:embed="rId6"/>
+          <a:stretch>
+            <a:fillRect/>
+          </a:stretch>
+        </p:blipFill>
+        <p:spPr>
+          <a:xfrm rot="20248114">
+            <a:off x="2790921" y="4220850"/>
+            <a:ext cx="960299" cy="1435608"/>
+          </a:xfrm>
+          <a:prstGeom prst="rect">
+            <a:avLst/>
+          </a:prstGeom>
+        </p:spPr>
+      </p:pic>
+      <p:pic>
+        <p:nvPicPr>
+          <p:cNvPr id="4" name="Picture 3">
+            <a:extLst>
+              <a:ext uri="{FF2B5EF4-FFF2-40B4-BE49-F238E27FC236}">
+                <a16:creationId xmlns:a16="http://schemas.microsoft.com/office/drawing/2014/main" id="{5222349B-F62C-8A19-CBB3-A11304F2603F}"/>
+              </a:ext>
+            </a:extLst>
+          </p:cNvPr>
+          <p:cNvPicPr>
+            <a:picLocks noChangeAspect="1"/>
+          </p:cNvPicPr>
+          <p:nvPr/>
+        </p:nvPicPr>
+        <p:blipFill>
+          <a:blip r:embed="rId6"/>
+          <a:stretch>
+            <a:fillRect/>
+          </a:stretch>
+        </p:blipFill>
+        <p:spPr>
+          <a:xfrm rot="10800000">
+            <a:off x="5023262" y="3282057"/>
+            <a:ext cx="960299" cy="1435608"/>
           </a:xfrm>
           <a:prstGeom prst="rect">
             <a:avLst/>

</xml_diff>